<commit_message>
Abstract class is done
</commit_message>
<xml_diff>
--- a/OOPExam/01 Class, Abstract Class and Interfaces.pptx
+++ b/OOPExam/01 Class, Abstract Class and Interfaces.pptx
@@ -5,7 +5,7 @@
     <p:sldMasterId id="2147483648" r:id="rId1"/>
   </p:sldMasterIdLst>
   <p:notesMasterIdLst>
-    <p:notesMasterId r:id="rId11"/>
+    <p:notesMasterId r:id="rId12"/>
   </p:notesMasterIdLst>
   <p:sldIdLst>
     <p:sldId id="256" r:id="rId2"/>
@@ -13,10 +13,11 @@
     <p:sldId id="261" r:id="rId4"/>
     <p:sldId id="259" r:id="rId5"/>
     <p:sldId id="258" r:id="rId6"/>
-    <p:sldId id="264" r:id="rId7"/>
-    <p:sldId id="262" r:id="rId8"/>
-    <p:sldId id="260" r:id="rId9"/>
-    <p:sldId id="263" r:id="rId10"/>
+    <p:sldId id="265" r:id="rId7"/>
+    <p:sldId id="264" r:id="rId8"/>
+    <p:sldId id="262" r:id="rId9"/>
+    <p:sldId id="260" r:id="rId10"/>
+    <p:sldId id="263" r:id="rId11"/>
   </p:sldIdLst>
   <p:sldSz cx="9144000" cy="6858000" type="screen4x3"/>
   <p:notesSz cx="6858000" cy="9144000"/>
@@ -200,7 +201,8 @@
           <a:p>
             <a:fld id="{D69E125A-D55E-45C6-9A62-FE6830745A2A}" type="datetimeFigureOut">
               <a:rPr lang="en-US" smtClean="0"/>
-              <a:t>1/12/2010</a:t>
+              <a:pPr/>
+              <a:t>1/16/2010</a:t>
             </a:fld>
             <a:endParaRPr lang="en-US"/>
           </a:p>
@@ -361,7 +363,8 @@
           <a:p>
             <a:fld id="{6C3390C7-C92A-440B-B67D-36FF6D2DBAFD}" type="slidenum">
               <a:rPr lang="en-US" smtClean="0"/>
-              <a:t>‹#›</a:t>
+              <a:pPr/>
+              <a:t>‹nr.›</a:t>
             </a:fld>
             <a:endParaRPr lang="en-US"/>
           </a:p>
@@ -649,7 +652,1022 @@
           <a:p>
             <a:fld id="{6C3390C7-C92A-440B-B67D-36FF6D2DBAFD}" type="slidenum">
               <a:rPr lang="en-US" smtClean="0"/>
+              <a:pPr/>
               <a:t>1</a:t>
+            </a:fld>
+            <a:endParaRPr lang="en-US"/>
+          </a:p>
+        </p:txBody>
+      </p:sp>
+    </p:spTree>
+  </p:cSld>
+  <p:clrMapOvr>
+    <a:masterClrMapping/>
+  </p:clrMapOvr>
+</p:notes>
+</file>
+
+<file path=ppt/notesSlides/notesSlide2.xml><?xml version="1.0" encoding="utf-8"?>
+<p:notes xmlns:a="http://schemas.openxmlformats.org/drawingml/2006/main" xmlns:r="http://schemas.openxmlformats.org/officeDocument/2006/relationships" xmlns:p="http://schemas.openxmlformats.org/presentationml/2006/main">
+  <p:cSld>
+    <p:spTree>
+      <p:nvGrpSpPr>
+        <p:cNvPr id="1" name=""/>
+        <p:cNvGrpSpPr/>
+        <p:nvPr/>
+      </p:nvGrpSpPr>
+      <p:grpSpPr>
+        <a:xfrm>
+          <a:off x="0" y="0"/>
+          <a:ext cx="0" cy="0"/>
+          <a:chOff x="0" y="0"/>
+          <a:chExt cx="0" cy="0"/>
+        </a:xfrm>
+      </p:grpSpPr>
+      <p:sp>
+        <p:nvSpPr>
+          <p:cNvPr id="2" name="Pladsholder til diasbillede 1"/>
+          <p:cNvSpPr>
+            <a:spLocks noGrp="1" noRot="1" noChangeAspect="1"/>
+          </p:cNvSpPr>
+          <p:nvPr>
+            <p:ph type="sldImg"/>
+          </p:nvPr>
+        </p:nvSpPr>
+        <p:spPr/>
+      </p:sp>
+      <p:sp>
+        <p:nvSpPr>
+          <p:cNvPr id="3" name="Pladsholder til noter 2"/>
+          <p:cNvSpPr>
+            <a:spLocks noGrp="1"/>
+          </p:cNvSpPr>
+          <p:nvPr>
+            <p:ph type="body" idx="1"/>
+          </p:nvPr>
+        </p:nvSpPr>
+        <p:spPr/>
+        <p:txBody>
+          <a:bodyPr>
+            <a:normAutofit/>
+          </a:bodyPr>
+          <a:lstStyle/>
+          <a:p>
+            <a:r>
+              <a:rPr lang="da-DK" dirty="0" smtClean="0"/>
+              <a:t>It </a:t>
+            </a:r>
+            <a:r>
+              <a:rPr lang="da-DK" dirty="0" err="1" smtClean="0"/>
+              <a:t>represents</a:t>
+            </a:r>
+            <a:r>
+              <a:rPr lang="da-DK" baseline="0" dirty="0" smtClean="0"/>
+              <a:t> a </a:t>
+            </a:r>
+            <a:r>
+              <a:rPr lang="da-DK" baseline="0" dirty="0" err="1" smtClean="0"/>
+              <a:t>concept</a:t>
+            </a:r>
+            <a:r>
+              <a:rPr lang="da-DK" baseline="0" dirty="0" smtClean="0"/>
+              <a:t> upon </a:t>
+            </a:r>
+            <a:r>
+              <a:rPr lang="da-DK" baseline="0" dirty="0" err="1" smtClean="0"/>
+              <a:t>which</a:t>
+            </a:r>
+            <a:r>
+              <a:rPr lang="da-DK" baseline="0" dirty="0" smtClean="0"/>
+              <a:t> </a:t>
+            </a:r>
+            <a:r>
+              <a:rPr lang="da-DK" baseline="0" dirty="0" err="1" smtClean="0"/>
+              <a:t>other</a:t>
+            </a:r>
+            <a:r>
+              <a:rPr lang="da-DK" baseline="0" dirty="0" smtClean="0"/>
+              <a:t> </a:t>
+            </a:r>
+            <a:r>
+              <a:rPr lang="da-DK" baseline="0" dirty="0" err="1" smtClean="0"/>
+              <a:t>classes</a:t>
+            </a:r>
+            <a:r>
+              <a:rPr lang="da-DK" baseline="0" dirty="0" smtClean="0"/>
+              <a:t> </a:t>
+            </a:r>
+            <a:r>
+              <a:rPr lang="da-DK" baseline="0" dirty="0" err="1" smtClean="0"/>
+              <a:t>can</a:t>
+            </a:r>
+            <a:r>
+              <a:rPr lang="da-DK" baseline="0" dirty="0" smtClean="0"/>
+              <a:t> </a:t>
+            </a:r>
+            <a:r>
+              <a:rPr lang="da-DK" baseline="0" dirty="0" err="1" smtClean="0"/>
+              <a:t>build</a:t>
+            </a:r>
+            <a:r>
+              <a:rPr lang="da-DK" baseline="0" dirty="0" smtClean="0"/>
+              <a:t> </a:t>
+            </a:r>
+            <a:r>
+              <a:rPr lang="da-DK" baseline="0" dirty="0" err="1" smtClean="0"/>
+              <a:t>their</a:t>
+            </a:r>
+            <a:r>
+              <a:rPr lang="da-DK" baseline="0" dirty="0" smtClean="0"/>
+              <a:t> definitions.</a:t>
+            </a:r>
+            <a:endParaRPr lang="da-DK" dirty="0" smtClean="0"/>
+          </a:p>
+          <a:p>
+            <a:r>
+              <a:rPr lang="da-DK" dirty="0" err="1" smtClean="0"/>
+              <a:t>Abstact</a:t>
+            </a:r>
+            <a:r>
+              <a:rPr lang="da-DK" dirty="0" smtClean="0"/>
+              <a:t> </a:t>
+            </a:r>
+            <a:r>
+              <a:rPr lang="da-DK" dirty="0" err="1" smtClean="0"/>
+              <a:t>methods</a:t>
+            </a:r>
+            <a:r>
+              <a:rPr lang="da-DK" dirty="0" smtClean="0"/>
+              <a:t> </a:t>
+            </a:r>
+            <a:r>
+              <a:rPr lang="da-DK" dirty="0" err="1" smtClean="0"/>
+              <a:t>are</a:t>
+            </a:r>
+            <a:r>
+              <a:rPr lang="da-DK" baseline="0" dirty="0" smtClean="0"/>
+              <a:t> </a:t>
+            </a:r>
+            <a:r>
+              <a:rPr lang="da-DK" baseline="0" dirty="0" err="1" smtClean="0"/>
+              <a:t>also</a:t>
+            </a:r>
+            <a:r>
+              <a:rPr lang="da-DK" baseline="0" dirty="0" smtClean="0"/>
+              <a:t> </a:t>
+            </a:r>
+            <a:r>
+              <a:rPr lang="da-DK" baseline="0" dirty="0" err="1" smtClean="0"/>
+              <a:t>used</a:t>
+            </a:r>
+            <a:r>
+              <a:rPr lang="da-DK" baseline="0" dirty="0" smtClean="0"/>
+              <a:t> to </a:t>
+            </a:r>
+            <a:r>
+              <a:rPr lang="da-DK" baseline="0" dirty="0" err="1" smtClean="0"/>
+              <a:t>define</a:t>
+            </a:r>
+            <a:r>
+              <a:rPr lang="da-DK" baseline="0" dirty="0" smtClean="0"/>
+              <a:t> C# interface. </a:t>
+            </a:r>
+            <a:r>
+              <a:rPr lang="da-DK" baseline="0" dirty="0" err="1" smtClean="0"/>
+              <a:t>Unlike</a:t>
+            </a:r>
+            <a:r>
+              <a:rPr lang="da-DK" baseline="0" dirty="0" smtClean="0"/>
+              <a:t> interfaces an </a:t>
+            </a:r>
+            <a:r>
+              <a:rPr lang="da-DK" baseline="0" dirty="0" err="1" smtClean="0"/>
+              <a:t>abstract</a:t>
+            </a:r>
+            <a:r>
+              <a:rPr lang="da-DK" baseline="0" dirty="0" smtClean="0"/>
+              <a:t> </a:t>
+            </a:r>
+            <a:r>
+              <a:rPr lang="da-DK" baseline="0" dirty="0" err="1" smtClean="0"/>
+              <a:t>class</a:t>
+            </a:r>
+            <a:r>
+              <a:rPr lang="da-DK" baseline="0" dirty="0" smtClean="0"/>
+              <a:t> </a:t>
+            </a:r>
+            <a:r>
+              <a:rPr lang="da-DK" baseline="0" dirty="0" err="1" smtClean="0"/>
+              <a:t>can</a:t>
+            </a:r>
+            <a:r>
+              <a:rPr lang="da-DK" baseline="0" dirty="0" smtClean="0"/>
+              <a:t> </a:t>
+            </a:r>
+            <a:r>
+              <a:rPr lang="da-DK" baseline="0" dirty="0" err="1" smtClean="0"/>
+              <a:t>contain</a:t>
+            </a:r>
+            <a:r>
+              <a:rPr lang="da-DK" baseline="0" dirty="0" smtClean="0"/>
+              <a:t> </a:t>
+            </a:r>
+            <a:r>
+              <a:rPr lang="da-DK" baseline="0" dirty="0" err="1" smtClean="0"/>
+              <a:t>methods</a:t>
+            </a:r>
+            <a:r>
+              <a:rPr lang="da-DK" baseline="0" dirty="0" smtClean="0"/>
+              <a:t> </a:t>
+            </a:r>
+            <a:r>
+              <a:rPr lang="da-DK" baseline="0" dirty="0" err="1" smtClean="0"/>
+              <a:t>that</a:t>
+            </a:r>
+            <a:r>
+              <a:rPr lang="da-DK" baseline="0" dirty="0" smtClean="0"/>
+              <a:t> </a:t>
+            </a:r>
+            <a:r>
+              <a:rPr lang="da-DK" baseline="0" dirty="0" err="1" smtClean="0"/>
+              <a:t>are</a:t>
+            </a:r>
+            <a:r>
+              <a:rPr lang="da-DK" baseline="0" dirty="0" smtClean="0"/>
+              <a:t> not </a:t>
+            </a:r>
+            <a:r>
+              <a:rPr lang="da-DK" baseline="0" dirty="0" err="1" smtClean="0"/>
+              <a:t>abstract</a:t>
+            </a:r>
+            <a:r>
+              <a:rPr lang="da-DK" baseline="0" dirty="0" smtClean="0"/>
+              <a:t> it </a:t>
+            </a:r>
+            <a:r>
+              <a:rPr lang="da-DK" baseline="0" dirty="0" err="1" smtClean="0"/>
+              <a:t>also</a:t>
+            </a:r>
+            <a:r>
+              <a:rPr lang="da-DK" baseline="0" dirty="0" smtClean="0"/>
+              <a:t> </a:t>
+            </a:r>
+            <a:r>
+              <a:rPr lang="da-DK" baseline="0" dirty="0" err="1" smtClean="0"/>
+              <a:t>can</a:t>
+            </a:r>
+            <a:r>
+              <a:rPr lang="da-DK" baseline="0" dirty="0" smtClean="0"/>
+              <a:t> </a:t>
+            </a:r>
+            <a:r>
+              <a:rPr lang="da-DK" baseline="0" dirty="0" err="1" smtClean="0"/>
+              <a:t>contain</a:t>
+            </a:r>
+            <a:r>
+              <a:rPr lang="da-DK" baseline="0" dirty="0" smtClean="0"/>
+              <a:t> data </a:t>
+            </a:r>
+            <a:r>
+              <a:rPr lang="da-DK" baseline="0" dirty="0" err="1" smtClean="0"/>
+              <a:t>declarations</a:t>
+            </a:r>
+            <a:r>
+              <a:rPr lang="da-DK" baseline="0" dirty="0" smtClean="0"/>
+              <a:t> </a:t>
+            </a:r>
+            <a:r>
+              <a:rPr lang="da-DK" baseline="0" dirty="0" err="1" smtClean="0"/>
+              <a:t>other</a:t>
+            </a:r>
+            <a:r>
+              <a:rPr lang="da-DK" baseline="0" dirty="0" smtClean="0"/>
+              <a:t> </a:t>
+            </a:r>
+            <a:r>
+              <a:rPr lang="da-DK" baseline="0" dirty="0" err="1" smtClean="0"/>
+              <a:t>than</a:t>
+            </a:r>
+            <a:r>
+              <a:rPr lang="da-DK" baseline="0" dirty="0" smtClean="0"/>
+              <a:t> </a:t>
+            </a:r>
+            <a:r>
+              <a:rPr lang="da-DK" baseline="0" dirty="0" err="1" smtClean="0"/>
+              <a:t>constants</a:t>
+            </a:r>
+            <a:r>
+              <a:rPr lang="da-DK" baseline="0" dirty="0" smtClean="0"/>
+              <a:t>.</a:t>
+            </a:r>
+          </a:p>
+          <a:p>
+            <a:r>
+              <a:rPr lang="da-DK" baseline="0" dirty="0" err="1" smtClean="0"/>
+              <a:t>Any</a:t>
+            </a:r>
+            <a:r>
+              <a:rPr lang="da-DK" baseline="0" dirty="0" smtClean="0"/>
+              <a:t> </a:t>
+            </a:r>
+            <a:r>
+              <a:rPr lang="da-DK" baseline="0" dirty="0" err="1" smtClean="0"/>
+              <a:t>class</a:t>
+            </a:r>
+            <a:r>
+              <a:rPr lang="da-DK" baseline="0" dirty="0" smtClean="0"/>
+              <a:t> </a:t>
+            </a:r>
+            <a:r>
+              <a:rPr lang="da-DK" baseline="0" dirty="0" err="1" smtClean="0"/>
+              <a:t>that</a:t>
+            </a:r>
+            <a:r>
+              <a:rPr lang="da-DK" baseline="0" dirty="0" smtClean="0"/>
+              <a:t> </a:t>
+            </a:r>
+            <a:r>
+              <a:rPr lang="da-DK" baseline="0" dirty="0" err="1" smtClean="0"/>
+              <a:t>contains</a:t>
+            </a:r>
+            <a:r>
+              <a:rPr lang="da-DK" baseline="0" dirty="0" smtClean="0"/>
+              <a:t> </a:t>
+            </a:r>
+            <a:r>
+              <a:rPr lang="da-DK" baseline="0" dirty="0" err="1" smtClean="0"/>
+              <a:t>abstract</a:t>
+            </a:r>
+            <a:r>
+              <a:rPr lang="da-DK" baseline="0" dirty="0" smtClean="0"/>
+              <a:t> </a:t>
+            </a:r>
+            <a:r>
+              <a:rPr lang="da-DK" baseline="0" dirty="0" err="1" smtClean="0"/>
+              <a:t>methods</a:t>
+            </a:r>
+            <a:r>
+              <a:rPr lang="da-DK" baseline="0" dirty="0" smtClean="0"/>
+              <a:t> (</a:t>
+            </a:r>
+            <a:r>
+              <a:rPr lang="da-DK" baseline="0" dirty="0" err="1" smtClean="0"/>
+              <a:t>unlike</a:t>
+            </a:r>
+            <a:r>
+              <a:rPr lang="da-DK" baseline="0" dirty="0" smtClean="0"/>
+              <a:t> interfaces) must </a:t>
+            </a:r>
+            <a:r>
+              <a:rPr lang="da-DK" baseline="0" dirty="0" err="1" smtClean="0"/>
+              <a:t>be</a:t>
+            </a:r>
+            <a:r>
+              <a:rPr lang="da-DK" baseline="0" dirty="0" smtClean="0"/>
+              <a:t> </a:t>
+            </a:r>
+            <a:r>
+              <a:rPr lang="da-DK" baseline="0" dirty="0" err="1" smtClean="0"/>
+              <a:t>declared</a:t>
+            </a:r>
+            <a:r>
+              <a:rPr lang="da-DK" baseline="0" dirty="0" smtClean="0"/>
+              <a:t> as </a:t>
+            </a:r>
+            <a:r>
+              <a:rPr lang="da-DK" baseline="0" dirty="0" err="1" smtClean="0"/>
+              <a:t>abstract</a:t>
+            </a:r>
+            <a:r>
+              <a:rPr lang="da-DK" baseline="0" dirty="0" smtClean="0"/>
+              <a:t>.</a:t>
+            </a:r>
+          </a:p>
+          <a:p>
+            <a:r>
+              <a:rPr lang="da-DK" baseline="0" dirty="0" smtClean="0"/>
+              <a:t>May </a:t>
+            </a:r>
+            <a:r>
+              <a:rPr lang="da-DK" baseline="0" dirty="0" err="1" smtClean="0"/>
+              <a:t>contain</a:t>
+            </a:r>
+            <a:r>
+              <a:rPr lang="da-DK" baseline="0" dirty="0" smtClean="0"/>
+              <a:t> a </a:t>
+            </a:r>
+            <a:r>
+              <a:rPr lang="da-DK" baseline="0" dirty="0" err="1" smtClean="0"/>
+              <a:t>partial</a:t>
+            </a:r>
+            <a:r>
+              <a:rPr lang="da-DK" baseline="0" dirty="0" smtClean="0"/>
+              <a:t> </a:t>
+            </a:r>
+            <a:r>
+              <a:rPr lang="da-DK" baseline="0" dirty="0" err="1" smtClean="0"/>
+              <a:t>description</a:t>
+            </a:r>
+            <a:r>
+              <a:rPr lang="da-DK" baseline="0" dirty="0" smtClean="0"/>
+              <a:t> </a:t>
+            </a:r>
+            <a:r>
+              <a:rPr lang="da-DK" baseline="0" dirty="0" err="1" smtClean="0"/>
+              <a:t>that</a:t>
+            </a:r>
+            <a:r>
+              <a:rPr lang="da-DK" baseline="0" dirty="0" smtClean="0"/>
+              <a:t> is </a:t>
+            </a:r>
+            <a:r>
+              <a:rPr lang="da-DK" baseline="0" dirty="0" err="1" smtClean="0"/>
+              <a:t>inherited</a:t>
+            </a:r>
+            <a:r>
+              <a:rPr lang="da-DK" baseline="0" dirty="0" smtClean="0"/>
+              <a:t> by all </a:t>
+            </a:r>
+            <a:r>
+              <a:rPr lang="da-DK" baseline="0" dirty="0" err="1" smtClean="0"/>
+              <a:t>its</a:t>
+            </a:r>
+            <a:r>
+              <a:rPr lang="da-DK" baseline="0" dirty="0" smtClean="0"/>
+              <a:t> </a:t>
+            </a:r>
+            <a:r>
+              <a:rPr lang="da-DK" baseline="0" dirty="0" err="1" smtClean="0"/>
+              <a:t>descendants</a:t>
+            </a:r>
+            <a:r>
+              <a:rPr lang="da-DK" baseline="0" dirty="0" smtClean="0"/>
+              <a:t>.</a:t>
+            </a:r>
+          </a:p>
+          <a:p>
+            <a:r>
+              <a:rPr lang="da-DK" baseline="0" dirty="0" smtClean="0"/>
+              <a:t>The </a:t>
+            </a:r>
+            <a:r>
+              <a:rPr lang="da-DK" baseline="0" dirty="0" err="1" smtClean="0"/>
+              <a:t>children</a:t>
+            </a:r>
+            <a:r>
+              <a:rPr lang="da-DK" baseline="0" dirty="0" smtClean="0"/>
+              <a:t> must </a:t>
+            </a:r>
+            <a:r>
+              <a:rPr lang="da-DK" baseline="0" dirty="0" err="1" smtClean="0"/>
+              <a:t>override</a:t>
+            </a:r>
+            <a:r>
+              <a:rPr lang="da-DK" baseline="0" dirty="0" smtClean="0"/>
+              <a:t> all the </a:t>
+            </a:r>
+            <a:r>
+              <a:rPr lang="da-DK" baseline="0" dirty="0" err="1" smtClean="0"/>
+              <a:t>parents</a:t>
+            </a:r>
+            <a:r>
+              <a:rPr lang="da-DK" baseline="0" dirty="0" smtClean="0"/>
+              <a:t> </a:t>
+            </a:r>
+            <a:r>
+              <a:rPr lang="da-DK" baseline="0" dirty="0" err="1" smtClean="0"/>
+              <a:t>abstract</a:t>
+            </a:r>
+            <a:r>
+              <a:rPr lang="da-DK" baseline="0" dirty="0" smtClean="0"/>
+              <a:t> </a:t>
+            </a:r>
+            <a:r>
+              <a:rPr lang="da-DK" baseline="0" dirty="0" err="1" smtClean="0"/>
+              <a:t>methods</a:t>
+            </a:r>
+            <a:r>
+              <a:rPr lang="da-DK" baseline="0" dirty="0" smtClean="0"/>
+              <a:t> </a:t>
+            </a:r>
+            <a:r>
+              <a:rPr lang="da-DK" baseline="0" dirty="0" err="1" smtClean="0"/>
+              <a:t>or</a:t>
+            </a:r>
+            <a:r>
+              <a:rPr lang="da-DK" baseline="0" dirty="0" smtClean="0"/>
+              <a:t> the </a:t>
+            </a:r>
+            <a:r>
+              <a:rPr lang="da-DK" baseline="0" dirty="0" err="1" smtClean="0"/>
+              <a:t>derived</a:t>
+            </a:r>
+            <a:r>
+              <a:rPr lang="da-DK" baseline="0" dirty="0" smtClean="0"/>
+              <a:t> </a:t>
+            </a:r>
+            <a:r>
+              <a:rPr lang="da-DK" baseline="0" dirty="0" err="1" smtClean="0"/>
+              <a:t>class</a:t>
+            </a:r>
+            <a:r>
+              <a:rPr lang="da-DK" baseline="0" dirty="0" smtClean="0"/>
+              <a:t> </a:t>
+            </a:r>
+            <a:r>
+              <a:rPr lang="da-DK" baseline="0" dirty="0" err="1" smtClean="0"/>
+              <a:t>will</a:t>
+            </a:r>
+            <a:r>
+              <a:rPr lang="da-DK" baseline="0" dirty="0" smtClean="0"/>
+              <a:t> </a:t>
+            </a:r>
+            <a:r>
+              <a:rPr lang="da-DK" baseline="0" dirty="0" err="1" smtClean="0"/>
+              <a:t>also</a:t>
+            </a:r>
+            <a:r>
+              <a:rPr lang="da-DK" baseline="0" dirty="0" smtClean="0"/>
+              <a:t> </a:t>
+            </a:r>
+            <a:r>
+              <a:rPr lang="da-DK" baseline="0" dirty="0" err="1" smtClean="0"/>
+              <a:t>be</a:t>
+            </a:r>
+            <a:r>
+              <a:rPr lang="da-DK" baseline="0" dirty="0" smtClean="0"/>
+              <a:t> </a:t>
+            </a:r>
+            <a:r>
+              <a:rPr lang="da-DK" baseline="0" dirty="0" err="1" smtClean="0"/>
+              <a:t>considered</a:t>
+            </a:r>
+            <a:r>
+              <a:rPr lang="da-DK" baseline="0" dirty="0" smtClean="0"/>
+              <a:t> </a:t>
+            </a:r>
+            <a:r>
+              <a:rPr lang="da-DK" baseline="0" dirty="0" err="1" smtClean="0"/>
+              <a:t>abstract</a:t>
+            </a:r>
+            <a:r>
+              <a:rPr lang="da-DK" baseline="0" dirty="0" smtClean="0"/>
+              <a:t>.</a:t>
+            </a:r>
+          </a:p>
+          <a:p>
+            <a:r>
+              <a:rPr lang="da-DK" baseline="0" dirty="0" err="1" smtClean="0"/>
+              <a:t>There</a:t>
+            </a:r>
+            <a:r>
+              <a:rPr lang="da-DK" baseline="0" dirty="0" smtClean="0"/>
+              <a:t> </a:t>
+            </a:r>
+            <a:r>
+              <a:rPr lang="da-DK" baseline="0" dirty="0" err="1" smtClean="0"/>
+              <a:t>are</a:t>
+            </a:r>
+            <a:r>
+              <a:rPr lang="da-DK" baseline="0" dirty="0" smtClean="0"/>
+              <a:t> </a:t>
+            </a:r>
+            <a:r>
+              <a:rPr lang="da-DK" baseline="0" dirty="0" err="1" smtClean="0"/>
+              <a:t>no</a:t>
+            </a:r>
+            <a:r>
+              <a:rPr lang="da-DK" baseline="0" dirty="0" smtClean="0"/>
+              <a:t> </a:t>
+            </a:r>
+            <a:r>
+              <a:rPr lang="da-DK" baseline="0" dirty="0" err="1" smtClean="0"/>
+              <a:t>restrictions</a:t>
+            </a:r>
+            <a:r>
+              <a:rPr lang="da-DK" baseline="0" dirty="0" smtClean="0"/>
+              <a:t> </a:t>
+            </a:r>
+            <a:r>
+              <a:rPr lang="da-DK" baseline="0" dirty="0" err="1" smtClean="0"/>
+              <a:t>where</a:t>
+            </a:r>
+            <a:r>
+              <a:rPr lang="da-DK" baseline="0" dirty="0" smtClean="0"/>
+              <a:t> a </a:t>
+            </a:r>
+            <a:r>
+              <a:rPr lang="da-DK" baseline="0" dirty="0" err="1" smtClean="0"/>
+              <a:t>abstract</a:t>
+            </a:r>
+            <a:r>
+              <a:rPr lang="da-DK" baseline="0" dirty="0" smtClean="0"/>
+              <a:t> </a:t>
+            </a:r>
+            <a:r>
+              <a:rPr lang="da-DK" baseline="0" dirty="0" err="1" smtClean="0"/>
+              <a:t>class</a:t>
+            </a:r>
+            <a:r>
+              <a:rPr lang="da-DK" baseline="0" dirty="0" smtClean="0"/>
+              <a:t> is </a:t>
+            </a:r>
+            <a:r>
+              <a:rPr lang="da-DK" baseline="0" dirty="0" err="1" smtClean="0"/>
+              <a:t>defined</a:t>
+            </a:r>
+            <a:r>
+              <a:rPr lang="da-DK" baseline="0" dirty="0" smtClean="0"/>
+              <a:t> in the </a:t>
+            </a:r>
+            <a:r>
+              <a:rPr lang="da-DK" baseline="0" dirty="0" err="1" smtClean="0"/>
+              <a:t>class</a:t>
+            </a:r>
+            <a:r>
+              <a:rPr lang="da-DK" baseline="0" dirty="0" smtClean="0"/>
+              <a:t> </a:t>
+            </a:r>
+            <a:r>
+              <a:rPr lang="da-DK" baseline="0" dirty="0" err="1" smtClean="0"/>
+              <a:t>hierarchy</a:t>
+            </a:r>
+            <a:r>
+              <a:rPr lang="da-DK" baseline="0" dirty="0" smtClean="0"/>
+              <a:t> but </a:t>
+            </a:r>
+            <a:r>
+              <a:rPr lang="da-DK" baseline="0" dirty="0" err="1" smtClean="0"/>
+              <a:t>usually</a:t>
+            </a:r>
+            <a:r>
+              <a:rPr lang="da-DK" baseline="0" dirty="0" smtClean="0"/>
+              <a:t> </a:t>
+            </a:r>
+            <a:r>
+              <a:rPr lang="da-DK" baseline="0" dirty="0" err="1" smtClean="0"/>
+              <a:t>they</a:t>
+            </a:r>
+            <a:r>
+              <a:rPr lang="da-DK" baseline="0" dirty="0" smtClean="0"/>
+              <a:t> </a:t>
+            </a:r>
+            <a:r>
+              <a:rPr lang="da-DK" baseline="0" dirty="0" err="1" smtClean="0"/>
+              <a:t>are</a:t>
+            </a:r>
+            <a:r>
+              <a:rPr lang="da-DK" baseline="0" dirty="0" smtClean="0"/>
+              <a:t> </a:t>
+            </a:r>
+            <a:r>
+              <a:rPr lang="da-DK" baseline="0" dirty="0" err="1" smtClean="0"/>
+              <a:t>locatede</a:t>
+            </a:r>
+            <a:r>
+              <a:rPr lang="da-DK" baseline="0" dirty="0" smtClean="0"/>
+              <a:t> at the upper </a:t>
+            </a:r>
+            <a:r>
+              <a:rPr lang="da-DK" baseline="0" dirty="0" err="1" smtClean="0"/>
+              <a:t>levels</a:t>
+            </a:r>
+            <a:r>
+              <a:rPr lang="da-DK" baseline="0" dirty="0" smtClean="0"/>
+              <a:t>.</a:t>
+            </a:r>
+          </a:p>
+          <a:p>
+            <a:r>
+              <a:rPr lang="da-DK" baseline="0" dirty="0" smtClean="0"/>
+              <a:t>An </a:t>
+            </a:r>
+            <a:r>
+              <a:rPr lang="da-DK" baseline="0" dirty="0" err="1" smtClean="0"/>
+              <a:t>abstract</a:t>
+            </a:r>
+            <a:r>
+              <a:rPr lang="da-DK" baseline="0" dirty="0" smtClean="0"/>
+              <a:t> </a:t>
+            </a:r>
+            <a:r>
+              <a:rPr lang="da-DK" baseline="0" dirty="0" err="1" smtClean="0"/>
+              <a:t>method</a:t>
+            </a:r>
+            <a:r>
+              <a:rPr lang="da-DK" baseline="0" dirty="0" smtClean="0"/>
+              <a:t> </a:t>
+            </a:r>
+            <a:r>
+              <a:rPr lang="da-DK" baseline="0" dirty="0" err="1" smtClean="0"/>
+              <a:t>shouldn’t</a:t>
+            </a:r>
+            <a:r>
+              <a:rPr lang="da-DK" baseline="0" dirty="0" smtClean="0"/>
+              <a:t> </a:t>
+            </a:r>
+            <a:r>
+              <a:rPr lang="da-DK" baseline="0" dirty="0" err="1" smtClean="0"/>
+              <a:t>be</a:t>
+            </a:r>
+            <a:r>
+              <a:rPr lang="da-DK" baseline="0" dirty="0" smtClean="0"/>
+              <a:t> </a:t>
+            </a:r>
+            <a:r>
+              <a:rPr lang="da-DK" baseline="0" dirty="0" err="1" smtClean="0"/>
+              <a:t>modified</a:t>
+            </a:r>
+            <a:r>
+              <a:rPr lang="da-DK" baseline="0" dirty="0" smtClean="0"/>
+              <a:t> as </a:t>
+            </a:r>
+            <a:r>
+              <a:rPr lang="da-DK" b="1" baseline="0" dirty="0" err="1" smtClean="0"/>
+              <a:t>static</a:t>
+            </a:r>
+            <a:r>
+              <a:rPr lang="da-DK" b="1" baseline="0" dirty="0" smtClean="0"/>
+              <a:t> </a:t>
+            </a:r>
+            <a:r>
+              <a:rPr lang="da-DK" b="0" baseline="0" dirty="0" err="1" smtClean="0"/>
+              <a:t>because</a:t>
+            </a:r>
+            <a:r>
+              <a:rPr lang="da-DK" b="0" baseline="0" dirty="0" smtClean="0"/>
+              <a:t> a </a:t>
+            </a:r>
+            <a:r>
+              <a:rPr lang="da-DK" b="0" baseline="0" dirty="0" err="1" smtClean="0"/>
+              <a:t>static</a:t>
+            </a:r>
+            <a:r>
+              <a:rPr lang="da-DK" b="0" baseline="0" dirty="0" smtClean="0"/>
+              <a:t> </a:t>
+            </a:r>
+            <a:r>
+              <a:rPr lang="da-DK" b="0" baseline="0" dirty="0" err="1" smtClean="0"/>
+              <a:t>method</a:t>
+            </a:r>
+            <a:r>
+              <a:rPr lang="da-DK" b="0" baseline="0" dirty="0" smtClean="0"/>
+              <a:t> </a:t>
+            </a:r>
+            <a:r>
+              <a:rPr lang="da-DK" b="0" baseline="0" dirty="0" err="1" smtClean="0"/>
+              <a:t>can</a:t>
+            </a:r>
+            <a:r>
+              <a:rPr lang="da-DK" b="0" baseline="0" dirty="0" smtClean="0"/>
+              <a:t> </a:t>
+            </a:r>
+            <a:r>
+              <a:rPr lang="da-DK" b="0" baseline="0" dirty="0" err="1" smtClean="0"/>
+              <a:t>be</a:t>
+            </a:r>
+            <a:r>
+              <a:rPr lang="da-DK" b="0" baseline="0" dirty="0" smtClean="0"/>
+              <a:t> </a:t>
+            </a:r>
+            <a:r>
+              <a:rPr lang="da-DK" b="0" baseline="0" dirty="0" err="1" smtClean="0"/>
+              <a:t>invoked</a:t>
+            </a:r>
+            <a:r>
+              <a:rPr lang="da-DK" b="0" baseline="0" dirty="0" smtClean="0"/>
+              <a:t> </a:t>
+            </a:r>
+            <a:r>
+              <a:rPr lang="da-DK" b="0" baseline="0" dirty="0" err="1" smtClean="0"/>
+              <a:t>using</a:t>
+            </a:r>
+            <a:r>
+              <a:rPr lang="da-DK" b="0" baseline="0" dirty="0" smtClean="0"/>
+              <a:t> the </a:t>
+            </a:r>
+            <a:r>
+              <a:rPr lang="da-DK" b="0" baseline="0" dirty="0" err="1" smtClean="0"/>
+              <a:t>class</a:t>
+            </a:r>
+            <a:r>
+              <a:rPr lang="da-DK" b="0" baseline="0" dirty="0" smtClean="0"/>
+              <a:t> </a:t>
+            </a:r>
+            <a:r>
+              <a:rPr lang="da-DK" b="0" baseline="0" dirty="0" err="1" smtClean="0"/>
+              <a:t>name</a:t>
+            </a:r>
+            <a:r>
+              <a:rPr lang="da-DK" b="0" baseline="0" dirty="0" smtClean="0"/>
+              <a:t> </a:t>
+            </a:r>
+            <a:r>
+              <a:rPr lang="da-DK" b="0" baseline="0" dirty="0" err="1" smtClean="0"/>
+              <a:t>without</a:t>
+            </a:r>
+            <a:r>
+              <a:rPr lang="da-DK" b="0" baseline="0" dirty="0" smtClean="0"/>
+              <a:t> </a:t>
+            </a:r>
+            <a:r>
+              <a:rPr lang="da-DK" b="0" baseline="0" dirty="0" err="1" smtClean="0"/>
+              <a:t>declaring</a:t>
+            </a:r>
+            <a:r>
+              <a:rPr lang="da-DK" b="0" baseline="0" dirty="0" smtClean="0"/>
+              <a:t> an </a:t>
+            </a:r>
+            <a:r>
+              <a:rPr lang="da-DK" b="0" baseline="0" dirty="0" err="1" smtClean="0"/>
+              <a:t>object</a:t>
+            </a:r>
+            <a:r>
+              <a:rPr lang="da-DK" b="0" baseline="0" dirty="0" smtClean="0"/>
+              <a:t> of the </a:t>
+            </a:r>
+            <a:r>
+              <a:rPr lang="da-DK" b="0" baseline="0" dirty="0" err="1" smtClean="0"/>
+              <a:t>class</a:t>
+            </a:r>
+            <a:r>
+              <a:rPr lang="da-DK" b="0" baseline="0" dirty="0" smtClean="0"/>
+              <a:t>. </a:t>
+            </a:r>
+            <a:r>
+              <a:rPr lang="da-DK" b="0" baseline="0" dirty="0" err="1" smtClean="0"/>
+              <a:t>This</a:t>
+            </a:r>
+            <a:r>
+              <a:rPr lang="da-DK" b="0" baseline="0" dirty="0" smtClean="0"/>
+              <a:t> is a </a:t>
+            </a:r>
+            <a:r>
+              <a:rPr lang="da-DK" b="0" baseline="0" dirty="0" err="1" smtClean="0"/>
+              <a:t>contradiction</a:t>
+            </a:r>
+            <a:r>
+              <a:rPr lang="da-DK" b="0" baseline="0" dirty="0" smtClean="0"/>
+              <a:t> </a:t>
+            </a:r>
+            <a:r>
+              <a:rPr lang="da-DK" b="0" baseline="0" dirty="0" err="1" smtClean="0"/>
+              <a:t>because</a:t>
+            </a:r>
+            <a:r>
+              <a:rPr lang="da-DK" b="0" baseline="0" dirty="0" smtClean="0"/>
+              <a:t> </a:t>
+            </a:r>
+            <a:r>
+              <a:rPr lang="da-DK" b="0" baseline="0" dirty="0" err="1" smtClean="0"/>
+              <a:t>abstract</a:t>
+            </a:r>
+            <a:r>
+              <a:rPr lang="da-DK" b="0" baseline="0" dirty="0" smtClean="0"/>
+              <a:t> </a:t>
+            </a:r>
+            <a:r>
+              <a:rPr lang="da-DK" b="0" baseline="0" dirty="0" err="1" smtClean="0"/>
+              <a:t>methods</a:t>
+            </a:r>
+            <a:r>
+              <a:rPr lang="da-DK" b="0" baseline="0" dirty="0" smtClean="0"/>
+              <a:t> have </a:t>
+            </a:r>
+            <a:r>
+              <a:rPr lang="da-DK" b="0" baseline="0" dirty="0" err="1" smtClean="0"/>
+              <a:t>no</a:t>
+            </a:r>
+            <a:r>
+              <a:rPr lang="da-DK" b="0" baseline="0" dirty="0" smtClean="0"/>
+              <a:t> </a:t>
+            </a:r>
+            <a:r>
+              <a:rPr lang="da-DK" b="0" baseline="0" dirty="0" err="1" smtClean="0"/>
+              <a:t>implementation</a:t>
+            </a:r>
+            <a:r>
+              <a:rPr lang="da-DK" b="0" baseline="0" dirty="0" smtClean="0"/>
+              <a:t>.</a:t>
+            </a:r>
+            <a:endParaRPr lang="da-DK" baseline="0" dirty="0" smtClean="0"/>
+          </a:p>
+          <a:p>
+            <a:r>
+              <a:rPr lang="da-DK" baseline="0" dirty="0" smtClean="0"/>
+              <a:t>By </a:t>
+            </a:r>
+            <a:r>
+              <a:rPr lang="da-DK" baseline="0" dirty="0" err="1" smtClean="0"/>
+              <a:t>using</a:t>
+            </a:r>
+            <a:r>
+              <a:rPr lang="da-DK" baseline="0" dirty="0" smtClean="0"/>
+              <a:t> </a:t>
+            </a:r>
+            <a:r>
+              <a:rPr lang="da-DK" baseline="0" dirty="0" err="1" smtClean="0"/>
+              <a:t>abstract</a:t>
+            </a:r>
+            <a:r>
+              <a:rPr lang="da-DK" baseline="0" dirty="0" smtClean="0"/>
+              <a:t> </a:t>
+            </a:r>
+            <a:r>
+              <a:rPr lang="da-DK" baseline="0" dirty="0" err="1" smtClean="0"/>
+              <a:t>classes</a:t>
+            </a:r>
+            <a:r>
+              <a:rPr lang="da-DK" baseline="0" dirty="0" smtClean="0"/>
+              <a:t> </a:t>
+            </a:r>
+            <a:r>
+              <a:rPr lang="da-DK" baseline="0" dirty="0" err="1" smtClean="0"/>
+              <a:t>wisely</a:t>
+            </a:r>
+            <a:r>
+              <a:rPr lang="da-DK" baseline="0" dirty="0" smtClean="0"/>
+              <a:t>, </a:t>
+            </a:r>
+            <a:r>
+              <a:rPr lang="da-DK" baseline="0" dirty="0" err="1" smtClean="0"/>
+              <a:t>code</a:t>
+            </a:r>
+            <a:r>
+              <a:rPr lang="da-DK" baseline="0" dirty="0" smtClean="0"/>
+              <a:t> </a:t>
+            </a:r>
+            <a:r>
+              <a:rPr lang="da-DK" baseline="0" dirty="0" err="1" smtClean="0"/>
+              <a:t>can</a:t>
+            </a:r>
+            <a:r>
+              <a:rPr lang="da-DK" baseline="0" dirty="0" smtClean="0"/>
+              <a:t> </a:t>
+            </a:r>
+            <a:r>
+              <a:rPr lang="da-DK" baseline="0" dirty="0" err="1" smtClean="0"/>
+              <a:t>be</a:t>
+            </a:r>
+            <a:r>
+              <a:rPr lang="da-DK" baseline="0" dirty="0" smtClean="0"/>
+              <a:t> </a:t>
+            </a:r>
+            <a:r>
+              <a:rPr lang="da-DK" baseline="0" dirty="0" err="1" smtClean="0"/>
+              <a:t>created</a:t>
+            </a:r>
+            <a:r>
+              <a:rPr lang="da-DK" baseline="0" dirty="0" smtClean="0"/>
+              <a:t> </a:t>
+            </a:r>
+            <a:r>
+              <a:rPr lang="da-DK" baseline="0" dirty="0" err="1" smtClean="0"/>
+              <a:t>flexible</a:t>
+            </a:r>
+            <a:r>
+              <a:rPr lang="da-DK" baseline="0" dirty="0" smtClean="0"/>
+              <a:t> and is </a:t>
+            </a:r>
+            <a:r>
+              <a:rPr lang="da-DK" baseline="0" dirty="0" err="1" smtClean="0"/>
+              <a:t>important</a:t>
+            </a:r>
+            <a:r>
+              <a:rPr lang="da-DK" baseline="0" dirty="0" smtClean="0"/>
+              <a:t> in </a:t>
+            </a:r>
+            <a:r>
+              <a:rPr lang="da-DK" baseline="0" dirty="0" err="1" smtClean="0"/>
+              <a:t>extensible</a:t>
+            </a:r>
+            <a:r>
+              <a:rPr lang="da-DK" baseline="0" dirty="0" smtClean="0"/>
+              <a:t> software designs. </a:t>
+            </a:r>
+            <a:endParaRPr lang="da-DK" dirty="0"/>
+          </a:p>
+        </p:txBody>
+      </p:sp>
+      <p:sp>
+        <p:nvSpPr>
+          <p:cNvPr id="4" name="Pladsholder til diasnummer 3"/>
+          <p:cNvSpPr>
+            <a:spLocks noGrp="1"/>
+          </p:cNvSpPr>
+          <p:nvPr>
+            <p:ph type="sldNum" sz="quarter" idx="10"/>
+          </p:nvPr>
+        </p:nvSpPr>
+        <p:spPr/>
+        <p:txBody>
+          <a:bodyPr/>
+          <a:lstStyle/>
+          <a:p>
+            <a:fld id="{6C3390C7-C92A-440B-B67D-36FF6D2DBAFD}" type="slidenum">
+              <a:rPr lang="en-US" smtClean="0"/>
+              <a:pPr/>
+              <a:t>5</a:t>
             </a:fld>
             <a:endParaRPr lang="en-US"/>
           </a:p>
@@ -845,7 +1863,7 @@
             <a:fld id="{3E57D7DC-7299-43C9-BAE2-F335855B8707}" type="datetimeFigureOut">
               <a:rPr lang="en-US" smtClean="0"/>
               <a:pPr/>
-              <a:t>1/12/2010</a:t>
+              <a:t>1/16/2010</a:t>
             </a:fld>
             <a:endParaRPr lang="da-DK"/>
           </a:p>
@@ -888,7 +1906,7 @@
             <a:fld id="{DD09C360-10AD-4B5E-BF9F-FAB61C3D4D92}" type="slidenum">
               <a:rPr lang="da-DK" smtClean="0"/>
               <a:pPr/>
-              <a:t>‹#›</a:t>
+              <a:t>‹nr.›</a:t>
             </a:fld>
             <a:endParaRPr lang="da-DK"/>
           </a:p>
@@ -1012,7 +2030,7 @@
             <a:fld id="{3E57D7DC-7299-43C9-BAE2-F335855B8707}" type="datetimeFigureOut">
               <a:rPr lang="en-US" smtClean="0"/>
               <a:pPr/>
-              <a:t>1/12/2010</a:t>
+              <a:t>1/16/2010</a:t>
             </a:fld>
             <a:endParaRPr lang="da-DK"/>
           </a:p>
@@ -1055,7 +2073,7 @@
             <a:fld id="{DD09C360-10AD-4B5E-BF9F-FAB61C3D4D92}" type="slidenum">
               <a:rPr lang="da-DK" smtClean="0"/>
               <a:pPr/>
-              <a:t>‹#›</a:t>
+              <a:t>‹nr.›</a:t>
             </a:fld>
             <a:endParaRPr lang="da-DK"/>
           </a:p>
@@ -1189,7 +2207,7 @@
             <a:fld id="{3E57D7DC-7299-43C9-BAE2-F335855B8707}" type="datetimeFigureOut">
               <a:rPr lang="en-US" smtClean="0"/>
               <a:pPr/>
-              <a:t>1/12/2010</a:t>
+              <a:t>1/16/2010</a:t>
             </a:fld>
             <a:endParaRPr lang="da-DK"/>
           </a:p>
@@ -1232,7 +2250,7 @@
             <a:fld id="{DD09C360-10AD-4B5E-BF9F-FAB61C3D4D92}" type="slidenum">
               <a:rPr lang="da-DK" smtClean="0"/>
               <a:pPr/>
-              <a:t>‹#›</a:t>
+              <a:t>‹nr.›</a:t>
             </a:fld>
             <a:endParaRPr lang="da-DK"/>
           </a:p>
@@ -1356,7 +2374,7 @@
             <a:fld id="{3E57D7DC-7299-43C9-BAE2-F335855B8707}" type="datetimeFigureOut">
               <a:rPr lang="en-US" smtClean="0"/>
               <a:pPr/>
-              <a:t>1/12/2010</a:t>
+              <a:t>1/16/2010</a:t>
             </a:fld>
             <a:endParaRPr lang="da-DK"/>
           </a:p>
@@ -1399,7 +2417,7 @@
             <a:fld id="{DD09C360-10AD-4B5E-BF9F-FAB61C3D4D92}" type="slidenum">
               <a:rPr lang="da-DK" smtClean="0"/>
               <a:pPr/>
-              <a:t>‹#›</a:t>
+              <a:t>‹nr.›</a:t>
             </a:fld>
             <a:endParaRPr lang="da-DK"/>
           </a:p>
@@ -1599,7 +2617,7 @@
             <a:fld id="{3E57D7DC-7299-43C9-BAE2-F335855B8707}" type="datetimeFigureOut">
               <a:rPr lang="en-US" smtClean="0"/>
               <a:pPr/>
-              <a:t>1/12/2010</a:t>
+              <a:t>1/16/2010</a:t>
             </a:fld>
             <a:endParaRPr lang="da-DK"/>
           </a:p>
@@ -1642,7 +2660,7 @@
             <a:fld id="{DD09C360-10AD-4B5E-BF9F-FAB61C3D4D92}" type="slidenum">
               <a:rPr lang="da-DK" smtClean="0"/>
               <a:pPr/>
-              <a:t>‹#›</a:t>
+              <a:t>‹nr.›</a:t>
             </a:fld>
             <a:endParaRPr lang="da-DK"/>
           </a:p>
@@ -1884,7 +2902,7 @@
             <a:fld id="{3E57D7DC-7299-43C9-BAE2-F335855B8707}" type="datetimeFigureOut">
               <a:rPr lang="en-US" smtClean="0"/>
               <a:pPr/>
-              <a:t>1/12/2010</a:t>
+              <a:t>1/16/2010</a:t>
             </a:fld>
             <a:endParaRPr lang="da-DK"/>
           </a:p>
@@ -1927,7 +2945,7 @@
             <a:fld id="{DD09C360-10AD-4B5E-BF9F-FAB61C3D4D92}" type="slidenum">
               <a:rPr lang="da-DK" smtClean="0"/>
               <a:pPr/>
-              <a:t>‹#›</a:t>
+              <a:t>‹nr.›</a:t>
             </a:fld>
             <a:endParaRPr lang="da-DK"/>
           </a:p>
@@ -2303,7 +3321,7 @@
             <a:fld id="{3E57D7DC-7299-43C9-BAE2-F335855B8707}" type="datetimeFigureOut">
               <a:rPr lang="en-US" smtClean="0"/>
               <a:pPr/>
-              <a:t>1/12/2010</a:t>
+              <a:t>1/16/2010</a:t>
             </a:fld>
             <a:endParaRPr lang="da-DK"/>
           </a:p>
@@ -2346,7 +3364,7 @@
             <a:fld id="{DD09C360-10AD-4B5E-BF9F-FAB61C3D4D92}" type="slidenum">
               <a:rPr lang="da-DK" smtClean="0"/>
               <a:pPr/>
-              <a:t>‹#›</a:t>
+              <a:t>‹nr.›</a:t>
             </a:fld>
             <a:endParaRPr lang="da-DK"/>
           </a:p>
@@ -2418,7 +3436,7 @@
             <a:fld id="{3E57D7DC-7299-43C9-BAE2-F335855B8707}" type="datetimeFigureOut">
               <a:rPr lang="en-US" smtClean="0"/>
               <a:pPr/>
-              <a:t>1/12/2010</a:t>
+              <a:t>1/16/2010</a:t>
             </a:fld>
             <a:endParaRPr lang="da-DK"/>
           </a:p>
@@ -2461,7 +3479,7 @@
             <a:fld id="{DD09C360-10AD-4B5E-BF9F-FAB61C3D4D92}" type="slidenum">
               <a:rPr lang="da-DK" smtClean="0"/>
               <a:pPr/>
-              <a:t>‹#›</a:t>
+              <a:t>‹nr.›</a:t>
             </a:fld>
             <a:endParaRPr lang="da-DK"/>
           </a:p>
@@ -2510,7 +3528,7 @@
             <a:fld id="{3E57D7DC-7299-43C9-BAE2-F335855B8707}" type="datetimeFigureOut">
               <a:rPr lang="en-US" smtClean="0"/>
               <a:pPr/>
-              <a:t>1/12/2010</a:t>
+              <a:t>1/16/2010</a:t>
             </a:fld>
             <a:endParaRPr lang="da-DK"/>
           </a:p>
@@ -2553,7 +3571,7 @@
             <a:fld id="{DD09C360-10AD-4B5E-BF9F-FAB61C3D4D92}" type="slidenum">
               <a:rPr lang="da-DK" smtClean="0"/>
               <a:pPr/>
-              <a:t>‹#›</a:t>
+              <a:t>‹nr.›</a:t>
             </a:fld>
             <a:endParaRPr lang="da-DK"/>
           </a:p>
@@ -2784,7 +3802,7 @@
             <a:fld id="{3E57D7DC-7299-43C9-BAE2-F335855B8707}" type="datetimeFigureOut">
               <a:rPr lang="en-US" smtClean="0"/>
               <a:pPr/>
-              <a:t>1/12/2010</a:t>
+              <a:t>1/16/2010</a:t>
             </a:fld>
             <a:endParaRPr lang="da-DK"/>
           </a:p>
@@ -2827,7 +3845,7 @@
             <a:fld id="{DD09C360-10AD-4B5E-BF9F-FAB61C3D4D92}" type="slidenum">
               <a:rPr lang="da-DK" smtClean="0"/>
               <a:pPr/>
-              <a:t>‹#›</a:t>
+              <a:t>‹nr.›</a:t>
             </a:fld>
             <a:endParaRPr lang="da-DK"/>
           </a:p>
@@ -3034,7 +4052,7 @@
             <a:fld id="{3E57D7DC-7299-43C9-BAE2-F335855B8707}" type="datetimeFigureOut">
               <a:rPr lang="en-US" smtClean="0"/>
               <a:pPr/>
-              <a:t>1/12/2010</a:t>
+              <a:t>1/16/2010</a:t>
             </a:fld>
             <a:endParaRPr lang="da-DK"/>
           </a:p>
@@ -3077,7 +4095,7 @@
             <a:fld id="{DD09C360-10AD-4B5E-BF9F-FAB61C3D4D92}" type="slidenum">
               <a:rPr lang="da-DK" smtClean="0"/>
               <a:pPr/>
-              <a:t>‹#›</a:t>
+              <a:t>‹nr.›</a:t>
             </a:fld>
             <a:endParaRPr lang="da-DK"/>
           </a:p>
@@ -3244,7 +4262,7 @@
             <a:fld id="{3E57D7DC-7299-43C9-BAE2-F335855B8707}" type="datetimeFigureOut">
               <a:rPr lang="en-US" smtClean="0"/>
               <a:pPr/>
-              <a:t>1/12/2010</a:t>
+              <a:t>1/16/2010</a:t>
             </a:fld>
             <a:endParaRPr lang="da-DK"/>
           </a:p>
@@ -3323,7 +4341,7 @@
             <a:fld id="{DD09C360-10AD-4B5E-BF9F-FAB61C3D4D92}" type="slidenum">
               <a:rPr lang="da-DK" smtClean="0"/>
               <a:pPr/>
-              <a:t>‹#›</a:t>
+              <a:t>‹nr.›</a:t>
             </a:fld>
             <a:endParaRPr lang="da-DK"/>
           </a:p>
@@ -3671,6 +4689,81 @@
 </p:sld>
 </file>
 
+<file path=ppt/slides/slide10.xml><?xml version="1.0" encoding="utf-8"?>
+<p:sld xmlns:a="http://schemas.openxmlformats.org/drawingml/2006/main" xmlns:r="http://schemas.openxmlformats.org/officeDocument/2006/relationships" xmlns:p="http://schemas.openxmlformats.org/presentationml/2006/main">
+  <p:cSld>
+    <p:spTree>
+      <p:nvGrpSpPr>
+        <p:cNvPr id="1" name=""/>
+        <p:cNvGrpSpPr/>
+        <p:nvPr/>
+      </p:nvGrpSpPr>
+      <p:grpSpPr>
+        <a:xfrm>
+          <a:off x="0" y="0"/>
+          <a:ext cx="0" cy="0"/>
+          <a:chOff x="0" y="0"/>
+          <a:chExt cx="0" cy="0"/>
+        </a:xfrm>
+      </p:grpSpPr>
+      <p:sp>
+        <p:nvSpPr>
+          <p:cNvPr id="2" name="Title 1"/>
+          <p:cNvSpPr>
+            <a:spLocks noGrp="1"/>
+          </p:cNvSpPr>
+          <p:nvPr>
+            <p:ph type="title"/>
+          </p:nvPr>
+        </p:nvSpPr>
+        <p:spPr/>
+        <p:txBody>
+          <a:bodyPr/>
+          <a:lstStyle/>
+          <a:p>
+            <a:r>
+              <a:rPr lang="en-US" dirty="0" smtClean="0"/>
+              <a:t>Use</a:t>
+            </a:r>
+            <a:r>
+              <a:rPr lang="da-DK" dirty="0" smtClean="0"/>
+              <a:t> i</a:t>
+            </a:r>
+            <a:r>
+              <a:rPr lang="en-US" dirty="0" smtClean="0"/>
+              <a:t>n our program</a:t>
+            </a:r>
+            <a:endParaRPr lang="en-US" dirty="0"/>
+          </a:p>
+        </p:txBody>
+      </p:sp>
+      <p:sp>
+        <p:nvSpPr>
+          <p:cNvPr id="3" name="Content Placeholder 2"/>
+          <p:cNvSpPr>
+            <a:spLocks noGrp="1"/>
+          </p:cNvSpPr>
+          <p:nvPr>
+            <p:ph idx="1"/>
+          </p:nvPr>
+        </p:nvSpPr>
+        <p:spPr/>
+        <p:txBody>
+          <a:bodyPr/>
+          <a:lstStyle/>
+          <a:p>
+            <a:endParaRPr lang="da-DK"/>
+          </a:p>
+        </p:txBody>
+      </p:sp>
+    </p:spTree>
+  </p:cSld>
+  <p:clrMapOvr>
+    <a:masterClrMapping/>
+  </p:clrMapOvr>
+</p:sld>
+</file>
+
 <file path=ppt/slides/slide2.xml><?xml version="1.0" encoding="utf-8"?>
 <p:sld xmlns:a="http://schemas.openxmlformats.org/drawingml/2006/main" xmlns:r="http://schemas.openxmlformats.org/officeDocument/2006/relationships" xmlns:p="http://schemas.openxmlformats.org/presentationml/2006/main">
   <p:cSld>
@@ -3832,7 +4925,7 @@
           <p:nvPr/>
         </p:nvPicPr>
         <p:blipFill>
-          <a:blip r:embed="rId2"/>
+          <a:blip r:embed="rId2" cstate="print"/>
           <a:srcRect/>
           <a:stretch>
             <a:fillRect/>
@@ -3954,7 +5047,7 @@
           <p:nvPr/>
         </p:nvPicPr>
         <p:blipFill>
-          <a:blip r:embed="rId2"/>
+          <a:blip r:embed="rId2" cstate="print"/>
           <a:srcRect/>
           <a:stretch>
             <a:fillRect/>
@@ -4038,10 +5131,337 @@
         </p:nvSpPr>
         <p:spPr/>
         <p:txBody>
-          <a:bodyPr/>
-          <a:lstStyle/>
-          <a:p>
-            <a:endParaRPr lang="da-DK"/>
+          <a:bodyPr>
+            <a:normAutofit fontScale="85000" lnSpcReduction="20000"/>
+          </a:bodyPr>
+          <a:lstStyle/>
+          <a:p>
+            <a:r>
+              <a:rPr lang="da-DK" dirty="0" err="1" smtClean="0"/>
+              <a:t>Generic</a:t>
+            </a:r>
+            <a:r>
+              <a:rPr lang="da-DK" dirty="0" smtClean="0"/>
+              <a:t> </a:t>
+            </a:r>
+            <a:r>
+              <a:rPr lang="da-DK" dirty="0" err="1" smtClean="0"/>
+              <a:t>concept</a:t>
+            </a:r>
+            <a:r>
+              <a:rPr lang="da-DK" dirty="0" smtClean="0"/>
+              <a:t> in </a:t>
+            </a:r>
+            <a:r>
+              <a:rPr lang="da-DK" dirty="0" err="1" smtClean="0"/>
+              <a:t>class</a:t>
+            </a:r>
+            <a:r>
+              <a:rPr lang="da-DK" dirty="0" smtClean="0"/>
+              <a:t> </a:t>
+            </a:r>
+            <a:r>
+              <a:rPr lang="da-DK" dirty="0" err="1" smtClean="0"/>
+              <a:t>hierarchy</a:t>
+            </a:r>
+            <a:endParaRPr lang="da-DK" dirty="0" smtClean="0"/>
+          </a:p>
+          <a:p>
+            <a:r>
+              <a:rPr lang="da-DK" dirty="0" err="1" smtClean="0"/>
+              <a:t>Cannot</a:t>
+            </a:r>
+            <a:r>
+              <a:rPr lang="da-DK" dirty="0" smtClean="0"/>
+              <a:t> </a:t>
+            </a:r>
+            <a:r>
+              <a:rPr lang="da-DK" dirty="0" err="1" smtClean="0"/>
+              <a:t>be</a:t>
+            </a:r>
+            <a:r>
+              <a:rPr lang="da-DK" dirty="0" smtClean="0"/>
+              <a:t> </a:t>
+            </a:r>
+            <a:r>
+              <a:rPr lang="da-DK" dirty="0" err="1" smtClean="0"/>
+              <a:t>instantiated</a:t>
+            </a:r>
+            <a:endParaRPr lang="da-DK" dirty="0" smtClean="0"/>
+          </a:p>
+          <a:p>
+            <a:r>
+              <a:rPr lang="da-DK" dirty="0" err="1" smtClean="0"/>
+              <a:t>Usually</a:t>
+            </a:r>
+            <a:r>
+              <a:rPr lang="da-DK" dirty="0" smtClean="0"/>
+              <a:t> </a:t>
+            </a:r>
+            <a:r>
+              <a:rPr lang="da-DK" dirty="0" err="1" smtClean="0"/>
+              <a:t>contains</a:t>
+            </a:r>
+            <a:r>
+              <a:rPr lang="da-DK" dirty="0" smtClean="0"/>
+              <a:t> som </a:t>
+            </a:r>
+            <a:r>
+              <a:rPr lang="da-DK" dirty="0" err="1" smtClean="0"/>
+              <a:t>abstract</a:t>
+            </a:r>
+            <a:r>
+              <a:rPr lang="da-DK" dirty="0" smtClean="0"/>
+              <a:t> </a:t>
+            </a:r>
+            <a:r>
+              <a:rPr lang="da-DK" dirty="0" err="1" smtClean="0"/>
+              <a:t>methods</a:t>
+            </a:r>
+            <a:endParaRPr lang="da-DK" dirty="0" smtClean="0"/>
+          </a:p>
+          <a:p>
+            <a:r>
+              <a:rPr lang="da-DK" dirty="0" err="1" smtClean="0"/>
+              <a:t>Class</a:t>
+            </a:r>
+            <a:r>
+              <a:rPr lang="da-DK" dirty="0" smtClean="0"/>
+              <a:t> is </a:t>
+            </a:r>
+            <a:r>
+              <a:rPr lang="da-DK" dirty="0" err="1" smtClean="0"/>
+              <a:t>declared</a:t>
+            </a:r>
+            <a:r>
+              <a:rPr lang="da-DK" dirty="0" smtClean="0"/>
+              <a:t> by </a:t>
+            </a:r>
+            <a:r>
+              <a:rPr lang="da-DK" dirty="0" err="1" smtClean="0"/>
+              <a:t>including</a:t>
+            </a:r>
+            <a:r>
+              <a:rPr lang="da-DK" dirty="0" smtClean="0"/>
+              <a:t> the </a:t>
+            </a:r>
+            <a:r>
+              <a:rPr lang="da-DK" b="1" dirty="0" err="1" smtClean="0"/>
+              <a:t>abstract</a:t>
+            </a:r>
+            <a:r>
+              <a:rPr lang="da-DK" b="1" dirty="0" smtClean="0"/>
+              <a:t> </a:t>
+            </a:r>
+            <a:r>
+              <a:rPr lang="da-DK" dirty="0" err="1" smtClean="0"/>
+              <a:t>modifier</a:t>
+            </a:r>
+            <a:r>
+              <a:rPr lang="da-DK" dirty="0" smtClean="0"/>
+              <a:t> in the </a:t>
+            </a:r>
+            <a:r>
+              <a:rPr lang="da-DK" dirty="0" err="1" smtClean="0"/>
+              <a:t>class</a:t>
+            </a:r>
+            <a:r>
+              <a:rPr lang="da-DK" dirty="0" smtClean="0"/>
+              <a:t> header</a:t>
+            </a:r>
+          </a:p>
+          <a:p>
+            <a:r>
+              <a:rPr lang="da-DK" dirty="0" err="1" smtClean="0"/>
+              <a:t>Used</a:t>
+            </a:r>
+            <a:r>
+              <a:rPr lang="da-DK" dirty="0" smtClean="0"/>
+              <a:t> to </a:t>
+            </a:r>
+            <a:r>
+              <a:rPr lang="da-DK" dirty="0" err="1" smtClean="0"/>
+              <a:t>declare</a:t>
+            </a:r>
+            <a:r>
+              <a:rPr lang="da-DK" dirty="0" smtClean="0"/>
+              <a:t> variables </a:t>
+            </a:r>
+            <a:r>
+              <a:rPr lang="da-DK" dirty="0" err="1" smtClean="0"/>
+              <a:t>that</a:t>
+            </a:r>
+            <a:r>
+              <a:rPr lang="da-DK" dirty="0" smtClean="0"/>
+              <a:t> is </a:t>
+            </a:r>
+            <a:r>
+              <a:rPr lang="da-DK" dirty="0" err="1" smtClean="0"/>
+              <a:t>generic</a:t>
+            </a:r>
+            <a:r>
+              <a:rPr lang="da-DK" dirty="0" smtClean="0"/>
+              <a:t> in all the </a:t>
+            </a:r>
+            <a:r>
+              <a:rPr lang="da-DK" dirty="0" err="1" smtClean="0"/>
+              <a:t>children</a:t>
+            </a:r>
+            <a:r>
+              <a:rPr lang="da-DK" dirty="0" smtClean="0"/>
+              <a:t> of the </a:t>
+            </a:r>
+            <a:r>
+              <a:rPr lang="da-DK" dirty="0" err="1" smtClean="0"/>
+              <a:t>class</a:t>
+            </a:r>
+            <a:endParaRPr lang="da-DK" dirty="0" smtClean="0"/>
+          </a:p>
+          <a:p>
+            <a:r>
+              <a:rPr lang="da-DK" dirty="0" err="1" smtClean="0"/>
+              <a:t>Abstract</a:t>
+            </a:r>
+            <a:r>
+              <a:rPr lang="da-DK" dirty="0" smtClean="0"/>
+              <a:t> </a:t>
+            </a:r>
+            <a:r>
+              <a:rPr lang="da-DK" dirty="0" err="1" smtClean="0"/>
+              <a:t>methods</a:t>
+            </a:r>
+            <a:r>
+              <a:rPr lang="da-DK" dirty="0" smtClean="0"/>
+              <a:t> </a:t>
+            </a:r>
+            <a:r>
+              <a:rPr lang="da-DK" dirty="0" err="1" smtClean="0"/>
+              <a:t>used</a:t>
+            </a:r>
+            <a:r>
+              <a:rPr lang="da-DK" dirty="0" smtClean="0"/>
+              <a:t> in the </a:t>
+            </a:r>
+            <a:r>
+              <a:rPr lang="da-DK" dirty="0" err="1" smtClean="0"/>
+              <a:t>children</a:t>
+            </a:r>
+            <a:r>
+              <a:rPr lang="da-DK" dirty="0" smtClean="0"/>
+              <a:t> must </a:t>
+            </a:r>
+            <a:r>
+              <a:rPr lang="da-DK" dirty="0" err="1" smtClean="0"/>
+              <a:t>be</a:t>
+            </a:r>
+            <a:r>
+              <a:rPr lang="da-DK" dirty="0" smtClean="0"/>
+              <a:t> </a:t>
+            </a:r>
+            <a:r>
+              <a:rPr lang="da-DK" dirty="0" err="1" smtClean="0"/>
+              <a:t>defined</a:t>
+            </a:r>
+            <a:r>
+              <a:rPr lang="da-DK" dirty="0" smtClean="0"/>
+              <a:t> in by </a:t>
+            </a:r>
+            <a:r>
+              <a:rPr lang="da-DK" dirty="0" err="1" smtClean="0"/>
+              <a:t>each</a:t>
+            </a:r>
+            <a:r>
+              <a:rPr lang="da-DK" dirty="0" smtClean="0"/>
+              <a:t> </a:t>
+            </a:r>
+            <a:r>
+              <a:rPr lang="da-DK" dirty="0" err="1" smtClean="0"/>
+              <a:t>child</a:t>
+            </a:r>
+            <a:endParaRPr lang="da-DK" dirty="0" smtClean="0"/>
+          </a:p>
+          <a:p>
+            <a:r>
+              <a:rPr lang="da-DK" dirty="0" err="1" smtClean="0"/>
+              <a:t>Classes</a:t>
+            </a:r>
+            <a:r>
+              <a:rPr lang="da-DK" dirty="0" smtClean="0"/>
+              <a:t> </a:t>
+            </a:r>
+            <a:r>
+              <a:rPr lang="da-DK" dirty="0" err="1" smtClean="0"/>
+              <a:t>that</a:t>
+            </a:r>
+            <a:r>
+              <a:rPr lang="da-DK" dirty="0" smtClean="0"/>
+              <a:t> </a:t>
+            </a:r>
+            <a:r>
+              <a:rPr lang="da-DK" dirty="0" err="1" smtClean="0"/>
+              <a:t>are</a:t>
+            </a:r>
+            <a:r>
+              <a:rPr lang="da-DK" dirty="0" smtClean="0"/>
+              <a:t> </a:t>
+            </a:r>
+            <a:r>
+              <a:rPr lang="da-DK" dirty="0" err="1" smtClean="0"/>
+              <a:t>derived</a:t>
+            </a:r>
+            <a:r>
+              <a:rPr lang="da-DK" dirty="0" smtClean="0"/>
+              <a:t> from an </a:t>
+            </a:r>
+            <a:r>
+              <a:rPr lang="da-DK" dirty="0" err="1" smtClean="0"/>
+              <a:t>abstract</a:t>
+            </a:r>
+            <a:r>
+              <a:rPr lang="da-DK" dirty="0" smtClean="0"/>
+              <a:t> </a:t>
+            </a:r>
+            <a:r>
+              <a:rPr lang="da-DK" dirty="0" err="1" smtClean="0"/>
+              <a:t>parent</a:t>
+            </a:r>
+            <a:r>
+              <a:rPr lang="da-DK" dirty="0" smtClean="0"/>
+              <a:t> must </a:t>
+            </a:r>
+            <a:r>
+              <a:rPr lang="da-DK" dirty="0" err="1" smtClean="0"/>
+              <a:t>override</a:t>
+            </a:r>
+            <a:r>
+              <a:rPr lang="da-DK" dirty="0" smtClean="0"/>
+              <a:t> all of the </a:t>
+            </a:r>
+            <a:r>
+              <a:rPr lang="da-DK" dirty="0" err="1" smtClean="0"/>
+              <a:t>parents</a:t>
+            </a:r>
+            <a:r>
+              <a:rPr lang="da-DK" dirty="0" smtClean="0"/>
+              <a:t> </a:t>
+            </a:r>
+            <a:r>
+              <a:rPr lang="da-DK" dirty="0" err="1" smtClean="0"/>
+              <a:t>methods</a:t>
+            </a:r>
+            <a:r>
+              <a:rPr lang="da-DK" dirty="0" smtClean="0"/>
+              <a:t>. </a:t>
+            </a:r>
+          </a:p>
+          <a:p>
+            <a:endParaRPr lang="da-DK" dirty="0" smtClean="0"/>
+          </a:p>
+          <a:p>
+            <a:endParaRPr lang="da-DK" dirty="0" smtClean="0"/>
+          </a:p>
+          <a:p>
+            <a:endParaRPr lang="da-DK" dirty="0"/>
           </a:p>
         </p:txBody>
       </p:sp>
@@ -4072,7 +5492,7 @@
       </p:grpSpPr>
       <p:sp>
         <p:nvSpPr>
-          <p:cNvPr id="2" name="Title 1"/>
+          <p:cNvPr id="2" name="Titel 1"/>
           <p:cNvSpPr>
             <a:spLocks noGrp="1"/>
           </p:cNvSpPr>
@@ -4086,29 +5506,310 @@
           <a:lstStyle/>
           <a:p>
             <a:r>
+              <a:rPr lang="da-DK" dirty="0" err="1" smtClean="0"/>
+              <a:t>Abstract</a:t>
+            </a:r>
+            <a:r>
+              <a:rPr lang="da-DK" dirty="0" smtClean="0"/>
+              <a:t> </a:t>
+            </a:r>
+            <a:r>
+              <a:rPr lang="da-DK" dirty="0" err="1" smtClean="0"/>
+              <a:t>class</a:t>
+            </a:r>
+            <a:r>
+              <a:rPr lang="da-DK" dirty="0" smtClean="0"/>
+              <a:t> </a:t>
+            </a:r>
+            <a:r>
+              <a:rPr lang="da-DK" dirty="0" err="1" smtClean="0"/>
+              <a:t>example</a:t>
+            </a:r>
+            <a:endParaRPr lang="da-DK" dirty="0"/>
+          </a:p>
+        </p:txBody>
+      </p:sp>
+      <p:sp>
+        <p:nvSpPr>
+          <p:cNvPr id="3" name="Pladsholder til indhold 2"/>
+          <p:cNvSpPr>
+            <a:spLocks noGrp="1"/>
+          </p:cNvSpPr>
+          <p:nvPr>
+            <p:ph idx="1"/>
+          </p:nvPr>
+        </p:nvSpPr>
+        <p:spPr/>
+        <p:txBody>
+          <a:bodyPr>
+            <a:normAutofit fontScale="70000" lnSpcReduction="20000"/>
+          </a:bodyPr>
+          <a:lstStyle/>
+          <a:p>
+            <a:pPr>
+              <a:buNone/>
+            </a:pPr>
+            <a:r>
+              <a:rPr lang="da-DK" dirty="0" err="1" smtClean="0"/>
+              <a:t>abstract</a:t>
+            </a:r>
+            <a:r>
+              <a:rPr lang="da-DK" dirty="0" smtClean="0"/>
+              <a:t> public </a:t>
+            </a:r>
+            <a:r>
+              <a:rPr lang="da-DK" dirty="0" err="1" smtClean="0"/>
+              <a:t>class</a:t>
+            </a:r>
+            <a:r>
+              <a:rPr lang="da-DK" dirty="0" smtClean="0"/>
+              <a:t> </a:t>
+            </a:r>
+            <a:r>
+              <a:rPr lang="da-DK" dirty="0" err="1" smtClean="0"/>
+              <a:t>Control</a:t>
+            </a:r>
+            <a:endParaRPr lang="da-DK" dirty="0" smtClean="0"/>
+          </a:p>
+          <a:p>
+            <a:pPr>
+              <a:buNone/>
+            </a:pPr>
+            <a:r>
+              <a:rPr lang="da-DK" dirty="0" smtClean="0"/>
+              <a:t>{</a:t>
+            </a:r>
+            <a:endParaRPr lang="da-DK" dirty="0" smtClean="0"/>
+          </a:p>
+          <a:p>
+            <a:pPr>
+              <a:buNone/>
+            </a:pPr>
+            <a:r>
               <a:rPr lang="en-US" dirty="0" smtClean="0"/>
-              <a:t>Abstract Class Vs Interface</a:t>
-            </a:r>
-            <a:endParaRPr lang="en-US" dirty="0"/>
-          </a:p>
-        </p:txBody>
-      </p:sp>
-      <p:sp>
-        <p:nvSpPr>
-          <p:cNvPr id="3" name="Content Placeholder 2"/>
-          <p:cNvSpPr>
-            <a:spLocks noGrp="1"/>
-          </p:cNvSpPr>
-          <p:nvPr>
-            <p:ph idx="1"/>
-          </p:nvPr>
-        </p:nvSpPr>
-        <p:spPr/>
-        <p:txBody>
-          <a:bodyPr/>
-          <a:lstStyle/>
-          <a:p>
-            <a:endParaRPr lang="da-DK"/>
+              <a:t>	</a:t>
+            </a:r>
+            <a:r>
+              <a:rPr lang="da-DK" dirty="0" err="1" smtClean="0"/>
+              <a:t>protected</a:t>
+            </a:r>
+            <a:r>
+              <a:rPr lang="da-DK" dirty="0" smtClean="0"/>
+              <a:t> </a:t>
+            </a:r>
+            <a:r>
+              <a:rPr lang="da-DK" dirty="0" err="1" smtClean="0"/>
+              <a:t>int</a:t>
+            </a:r>
+            <a:r>
+              <a:rPr lang="da-DK" dirty="0" smtClean="0"/>
+              <a:t> top;</a:t>
+            </a:r>
+          </a:p>
+          <a:p>
+            <a:pPr>
+              <a:buNone/>
+            </a:pPr>
+            <a:r>
+              <a:rPr lang="da-DK" dirty="0" smtClean="0"/>
+              <a:t>	</a:t>
+            </a:r>
+            <a:r>
+              <a:rPr lang="da-DK" dirty="0" err="1" smtClean="0"/>
+              <a:t>protected</a:t>
+            </a:r>
+            <a:r>
+              <a:rPr lang="da-DK" dirty="0" smtClean="0"/>
+              <a:t> </a:t>
+            </a:r>
+            <a:r>
+              <a:rPr lang="da-DK" dirty="0" err="1" smtClean="0"/>
+              <a:t>int</a:t>
+            </a:r>
+            <a:r>
+              <a:rPr lang="da-DK" dirty="0" smtClean="0"/>
+              <a:t> </a:t>
+            </a:r>
+            <a:r>
+              <a:rPr lang="da-DK" dirty="0" err="1" smtClean="0"/>
+              <a:t>left</a:t>
+            </a:r>
+            <a:r>
+              <a:rPr lang="da-DK" dirty="0" smtClean="0"/>
+              <a:t>;</a:t>
+            </a:r>
+          </a:p>
+          <a:p>
+            <a:pPr lvl="2">
+              <a:buNone/>
+            </a:pPr>
+            <a:r>
+              <a:rPr lang="en-US" sz="2200" dirty="0" smtClean="0"/>
+              <a:t>// constructor takes two integers to</a:t>
+            </a:r>
+          </a:p>
+          <a:p>
+            <a:pPr lvl="2">
+              <a:buNone/>
+            </a:pPr>
+            <a:r>
+              <a:rPr lang="en-US" sz="2200" dirty="0" smtClean="0"/>
+              <a:t>// fix location on the console</a:t>
+            </a:r>
+          </a:p>
+          <a:p>
+            <a:pPr>
+              <a:buNone/>
+            </a:pPr>
+            <a:r>
+              <a:rPr lang="en-US" dirty="0" smtClean="0"/>
+              <a:t>	protected </a:t>
+            </a:r>
+            <a:r>
+              <a:rPr lang="en-US" dirty="0" smtClean="0"/>
+              <a:t>Control(</a:t>
+            </a:r>
+            <a:r>
+              <a:rPr lang="en-US" dirty="0" err="1" smtClean="0"/>
+              <a:t>int</a:t>
+            </a:r>
+            <a:r>
+              <a:rPr lang="en-US" dirty="0" smtClean="0"/>
+              <a:t> top, </a:t>
+            </a:r>
+            <a:r>
+              <a:rPr lang="en-US" dirty="0" err="1" smtClean="0"/>
+              <a:t>int</a:t>
+            </a:r>
+            <a:r>
+              <a:rPr lang="en-US" dirty="0" smtClean="0"/>
+              <a:t> left)</a:t>
+            </a:r>
+          </a:p>
+          <a:p>
+            <a:pPr>
+              <a:buNone/>
+            </a:pPr>
+            <a:r>
+              <a:rPr lang="da-DK" dirty="0" smtClean="0"/>
+              <a:t>	{</a:t>
+            </a:r>
+            <a:endParaRPr lang="da-DK" dirty="0" smtClean="0"/>
+          </a:p>
+          <a:p>
+            <a:pPr>
+              <a:buNone/>
+            </a:pPr>
+            <a:r>
+              <a:rPr lang="da-DK" dirty="0" smtClean="0"/>
+              <a:t>		</a:t>
+            </a:r>
+            <a:r>
+              <a:rPr lang="da-DK" dirty="0" err="1" smtClean="0"/>
+              <a:t>this.top</a:t>
+            </a:r>
+            <a:r>
+              <a:rPr lang="da-DK" dirty="0" smtClean="0"/>
+              <a:t> </a:t>
+            </a:r>
+            <a:r>
+              <a:rPr lang="da-DK" dirty="0" smtClean="0"/>
+              <a:t>= top;</a:t>
+            </a:r>
+          </a:p>
+          <a:p>
+            <a:pPr>
+              <a:buNone/>
+            </a:pPr>
+            <a:r>
+              <a:rPr lang="da-DK" dirty="0" smtClean="0"/>
+              <a:t>		</a:t>
+            </a:r>
+            <a:r>
+              <a:rPr lang="da-DK" dirty="0" err="1" smtClean="0"/>
+              <a:t>this.left</a:t>
+            </a:r>
+            <a:r>
+              <a:rPr lang="da-DK" dirty="0" smtClean="0"/>
+              <a:t> </a:t>
+            </a:r>
+            <a:r>
+              <a:rPr lang="da-DK" dirty="0" smtClean="0"/>
+              <a:t>= </a:t>
+            </a:r>
+            <a:r>
+              <a:rPr lang="da-DK" dirty="0" err="1" smtClean="0"/>
+              <a:t>left</a:t>
+            </a:r>
+            <a:r>
+              <a:rPr lang="da-DK" dirty="0" smtClean="0"/>
+              <a:t>;</a:t>
+            </a:r>
+          </a:p>
+          <a:p>
+            <a:pPr>
+              <a:buNone/>
+            </a:pPr>
+            <a:r>
+              <a:rPr lang="da-DK" dirty="0" smtClean="0"/>
+              <a:t>	}</a:t>
+            </a:r>
+            <a:endParaRPr lang="da-DK" dirty="0" smtClean="0"/>
+          </a:p>
+          <a:p>
+            <a:pPr>
+              <a:buNone/>
+            </a:pPr>
+            <a:r>
+              <a:rPr lang="da-DK" smtClean="0"/>
+              <a:t>	</a:t>
+            </a:r>
+            <a:r>
+              <a:rPr lang="da-DK" dirty="0" smtClean="0"/>
+              <a:t>	</a:t>
+            </a:r>
+            <a:r>
+              <a:rPr lang="da-DK" dirty="0" err="1" smtClean="0"/>
+              <a:t>abstract</a:t>
+            </a:r>
+            <a:r>
+              <a:rPr lang="da-DK" dirty="0" smtClean="0"/>
+              <a:t> </a:t>
+            </a:r>
+            <a:r>
+              <a:rPr lang="da-DK" dirty="0" smtClean="0"/>
+              <a:t>public </a:t>
+            </a:r>
+            <a:r>
+              <a:rPr lang="da-DK" dirty="0" err="1" smtClean="0"/>
+              <a:t>void</a:t>
+            </a:r>
+            <a:r>
+              <a:rPr lang="da-DK" dirty="0" smtClean="0"/>
+              <a:t> </a:t>
+            </a:r>
+            <a:r>
+              <a:rPr lang="da-DK" dirty="0" err="1" smtClean="0"/>
+              <a:t>DrawWindow</a:t>
+            </a:r>
+            <a:r>
+              <a:rPr lang="da-DK" dirty="0" smtClean="0"/>
+              <a:t>( </a:t>
+            </a:r>
+            <a:r>
+              <a:rPr lang="da-DK" dirty="0" smtClean="0"/>
+              <a:t>);</a:t>
+            </a:r>
+          </a:p>
+          <a:p>
+            <a:pPr>
+              <a:buNone/>
+            </a:pPr>
+            <a:r>
+              <a:rPr lang="da-DK" dirty="0" smtClean="0"/>
+              <a:t>}</a:t>
+            </a:r>
+            <a:endParaRPr lang="da-DK" dirty="0"/>
           </a:p>
         </p:txBody>
       </p:sp>
@@ -4154,7 +5855,7 @@
           <a:p>
             <a:r>
               <a:rPr lang="en-US" dirty="0" smtClean="0"/>
-              <a:t>Garbage Collector</a:t>
+              <a:t>Abstract Class Vs Interface</a:t>
             </a:r>
             <a:endParaRPr lang="en-US" dirty="0"/>
           </a:p>
@@ -4175,32 +5876,7 @@
           <a:bodyPr/>
           <a:lstStyle/>
           <a:p>
-            <a:r>
-              <a:rPr lang="en-US" dirty="0" smtClean="0"/>
-              <a:t>C# performs automatic garbage collection</a:t>
-            </a:r>
-          </a:p>
-          <a:p>
-            <a:pPr lvl="1"/>
-            <a:r>
-              <a:rPr lang="en-US" dirty="0" smtClean="0"/>
-              <a:t>Collection/removing objects that are marked as garbage</a:t>
-            </a:r>
-          </a:p>
-          <a:p>
-            <a:pPr lvl="1"/>
-            <a:r>
-              <a:rPr lang="en-US" dirty="0" smtClean="0"/>
-              <a:t>Object that no longer has a reference</a:t>
-            </a:r>
-          </a:p>
-          <a:p>
-            <a:pPr lvl="1"/>
-            <a:r>
-              <a:rPr lang="en-US" dirty="0" smtClean="0"/>
-              <a:t>C# programmers don’t need to worry about explicitly reclaiming memory that has become garbage </a:t>
-            </a:r>
-            <a:endParaRPr lang="en-US" dirty="0"/>
+            <a:endParaRPr lang="da-DK"/>
           </a:p>
         </p:txBody>
       </p:sp>
@@ -4246,36 +5922,53 @@
           <a:p>
             <a:r>
               <a:rPr lang="en-US" dirty="0" smtClean="0"/>
-              <a:t>Use</a:t>
-            </a:r>
-            <a:r>
-              <a:rPr lang="da-DK" dirty="0" smtClean="0"/>
-              <a:t> i</a:t>
-            </a:r>
+              <a:t>Garbage Collector</a:t>
+            </a:r>
+            <a:endParaRPr lang="en-US" dirty="0"/>
+          </a:p>
+        </p:txBody>
+      </p:sp>
+      <p:sp>
+        <p:nvSpPr>
+          <p:cNvPr id="3" name="Content Placeholder 2"/>
+          <p:cNvSpPr>
+            <a:spLocks noGrp="1"/>
+          </p:cNvSpPr>
+          <p:nvPr>
+            <p:ph idx="1"/>
+          </p:nvPr>
+        </p:nvSpPr>
+        <p:spPr/>
+        <p:txBody>
+          <a:bodyPr/>
+          <a:lstStyle/>
+          <a:p>
             <a:r>
               <a:rPr lang="en-US" dirty="0" smtClean="0"/>
-              <a:t>n our program</a:t>
+              <a:t>C# performs automatic garbage collection</a:t>
+            </a:r>
+          </a:p>
+          <a:p>
+            <a:pPr lvl="1"/>
+            <a:r>
+              <a:rPr lang="en-US" dirty="0" smtClean="0"/>
+              <a:t>Collection/removing objects that are marked as garbage</a:t>
+            </a:r>
+          </a:p>
+          <a:p>
+            <a:pPr lvl="1"/>
+            <a:r>
+              <a:rPr lang="en-US" dirty="0" smtClean="0"/>
+              <a:t>Object that no longer has a reference</a:t>
+            </a:r>
+          </a:p>
+          <a:p>
+            <a:pPr lvl="1"/>
+            <a:r>
+              <a:rPr lang="en-US" dirty="0" smtClean="0"/>
+              <a:t>C# programmers don’t need to worry about explicitly reclaiming memory that has become garbage </a:t>
             </a:r>
             <a:endParaRPr lang="en-US" dirty="0"/>
-          </a:p>
-        </p:txBody>
-      </p:sp>
-      <p:sp>
-        <p:nvSpPr>
-          <p:cNvPr id="3" name="Content Placeholder 2"/>
-          <p:cNvSpPr>
-            <a:spLocks noGrp="1"/>
-          </p:cNvSpPr>
-          <p:nvPr>
-            <p:ph idx="1"/>
-          </p:nvPr>
-        </p:nvSpPr>
-        <p:spPr/>
-        <p:txBody>
-          <a:bodyPr/>
-          <a:lstStyle/>
-          <a:p>
-            <a:endParaRPr lang="da-DK"/>
           </a:p>
         </p:txBody>
       </p:sp>

</xml_diff>

<commit_message>
Absract Class Vs Interface are finished
</commit_message>
<xml_diff>
--- a/OOPExam/01 Class, Abstract Class and Interfaces.pptx
+++ b/OOPExam/01 Class, Abstract Class and Interfaces.pptx
@@ -5761,12 +5761,8 @@
               <a:buNone/>
             </a:pPr>
             <a:r>
-              <a:rPr lang="da-DK" smtClean="0"/>
-              <a:t>	</a:t>
-            </a:r>
-            <a:r>
-              <a:rPr lang="da-DK" dirty="0" smtClean="0"/>
-              <a:t>	</a:t>
+              <a:rPr lang="da-DK" dirty="0" smtClean="0"/>
+              <a:t>		</a:t>
             </a:r>
             <a:r>
               <a:rPr lang="da-DK" dirty="0" err="1" smtClean="0"/>
@@ -5876,7 +5872,130 @@
           <a:bodyPr/>
           <a:lstStyle/>
           <a:p>
-            <a:endParaRPr lang="da-DK"/>
+            <a:r>
+              <a:rPr lang="da-DK" dirty="0" smtClean="0"/>
+              <a:t>Interfaces </a:t>
+            </a:r>
+            <a:r>
+              <a:rPr lang="da-DK" dirty="0" err="1" smtClean="0"/>
+              <a:t>are</a:t>
+            </a:r>
+            <a:r>
+              <a:rPr lang="da-DK" dirty="0" smtClean="0"/>
+              <a:t> </a:t>
+            </a:r>
+            <a:r>
+              <a:rPr lang="da-DK" dirty="0" err="1" smtClean="0"/>
+              <a:t>very</a:t>
+            </a:r>
+            <a:r>
+              <a:rPr lang="da-DK" dirty="0" smtClean="0"/>
+              <a:t> </a:t>
+            </a:r>
+            <a:r>
+              <a:rPr lang="da-DK" dirty="0" err="1" smtClean="0"/>
+              <a:t>smiliar</a:t>
+            </a:r>
+            <a:r>
+              <a:rPr lang="da-DK" dirty="0" smtClean="0"/>
+              <a:t> to </a:t>
+            </a:r>
+            <a:r>
+              <a:rPr lang="da-DK" dirty="0" err="1" smtClean="0"/>
+              <a:t>abstract</a:t>
+            </a:r>
+            <a:r>
+              <a:rPr lang="da-DK" dirty="0" smtClean="0"/>
+              <a:t> </a:t>
+            </a:r>
+            <a:r>
+              <a:rPr lang="da-DK" dirty="0" err="1" smtClean="0"/>
+              <a:t>classes</a:t>
+            </a:r>
+            <a:endParaRPr lang="da-DK" dirty="0" smtClean="0"/>
+          </a:p>
+          <a:p>
+            <a:r>
+              <a:rPr lang="da-DK" dirty="0" smtClean="0"/>
+              <a:t>Interfaces </a:t>
+            </a:r>
+            <a:r>
+              <a:rPr lang="da-DK" dirty="0" err="1" smtClean="0"/>
+              <a:t>are</a:t>
+            </a:r>
+            <a:r>
+              <a:rPr lang="da-DK" dirty="0" smtClean="0"/>
+              <a:t> </a:t>
+            </a:r>
+            <a:r>
+              <a:rPr lang="da-DK" dirty="0" err="1" smtClean="0"/>
+              <a:t>used</a:t>
+            </a:r>
+            <a:r>
+              <a:rPr lang="da-DK" dirty="0" smtClean="0"/>
+              <a:t> </a:t>
+            </a:r>
+            <a:r>
+              <a:rPr lang="da-DK" dirty="0" err="1" smtClean="0"/>
+              <a:t>instead</a:t>
+            </a:r>
+            <a:r>
+              <a:rPr lang="da-DK" dirty="0" smtClean="0"/>
+              <a:t> of </a:t>
+            </a:r>
+            <a:r>
+              <a:rPr lang="da-DK" dirty="0" err="1" smtClean="0"/>
+              <a:t>abstract</a:t>
+            </a:r>
+            <a:r>
+              <a:rPr lang="da-DK" dirty="0" smtClean="0"/>
+              <a:t> </a:t>
+            </a:r>
+            <a:r>
+              <a:rPr lang="da-DK" dirty="0" err="1" smtClean="0"/>
+              <a:t>classes</a:t>
+            </a:r>
+            <a:r>
+              <a:rPr lang="da-DK" dirty="0" smtClean="0"/>
+              <a:t> </a:t>
+            </a:r>
+            <a:r>
+              <a:rPr lang="da-DK" dirty="0" err="1" smtClean="0"/>
+              <a:t>because</a:t>
+            </a:r>
+            <a:r>
+              <a:rPr lang="da-DK" dirty="0" smtClean="0"/>
+              <a:t> C# </a:t>
+            </a:r>
+            <a:r>
+              <a:rPr lang="da-DK" dirty="0" err="1" smtClean="0"/>
+              <a:t>doesn’t</a:t>
+            </a:r>
+            <a:r>
+              <a:rPr lang="da-DK" dirty="0" smtClean="0"/>
+              <a:t> </a:t>
+            </a:r>
+            <a:r>
+              <a:rPr lang="da-DK" dirty="0" err="1" smtClean="0"/>
+              <a:t>allow</a:t>
+            </a:r>
+            <a:r>
+              <a:rPr lang="da-DK" dirty="0" smtClean="0"/>
+              <a:t> </a:t>
+            </a:r>
+            <a:r>
+              <a:rPr lang="da-DK" dirty="0" err="1" smtClean="0"/>
+              <a:t>inheritance</a:t>
+            </a:r>
+            <a:r>
+              <a:rPr lang="da-DK" dirty="0" smtClean="0"/>
+              <a:t> from multiple </a:t>
+            </a:r>
+            <a:r>
+              <a:rPr lang="da-DK" smtClean="0"/>
+              <a:t>classes</a:t>
+            </a:r>
+            <a:endParaRPr lang="da-DK" dirty="0"/>
           </a:p>
         </p:txBody>
       </p:sp>

</xml_diff>